<commit_message>
Amend CRC cards to better match current project code
</commit_message>
<xml_diff>
--- a/phase0/crccards.pptx
+++ b/phase0/crccards.pptx
@@ -261,7 +261,7 @@
           <a:p>
             <a:fld id="{8F678F51-D1F2-DA4B-8DE2-DE3EB3967F2D}" type="datetimeFigureOut">
               <a:rPr lang="en-US" smtClean="0"/>
-              <a:t>10/12/21</a:t>
+              <a:t>10/16/2021</a:t>
             </a:fld>
             <a:endParaRPr lang="en-US"/>
           </a:p>
@@ -459,7 +459,7 @@
           <a:p>
             <a:fld id="{8F678F51-D1F2-DA4B-8DE2-DE3EB3967F2D}" type="datetimeFigureOut">
               <a:rPr lang="en-US" smtClean="0"/>
-              <a:t>10/12/21</a:t>
+              <a:t>10/16/2021</a:t>
             </a:fld>
             <a:endParaRPr lang="en-US"/>
           </a:p>
@@ -667,7 +667,7 @@
           <a:p>
             <a:fld id="{8F678F51-D1F2-DA4B-8DE2-DE3EB3967F2D}" type="datetimeFigureOut">
               <a:rPr lang="en-US" smtClean="0"/>
-              <a:t>10/12/21</a:t>
+              <a:t>10/16/2021</a:t>
             </a:fld>
             <a:endParaRPr lang="en-US"/>
           </a:p>
@@ -865,7 +865,7 @@
           <a:p>
             <a:fld id="{8F678F51-D1F2-DA4B-8DE2-DE3EB3967F2D}" type="datetimeFigureOut">
               <a:rPr lang="en-US" smtClean="0"/>
-              <a:t>10/12/21</a:t>
+              <a:t>10/16/2021</a:t>
             </a:fld>
             <a:endParaRPr lang="en-US"/>
           </a:p>
@@ -1140,7 +1140,7 @@
           <a:p>
             <a:fld id="{8F678F51-D1F2-DA4B-8DE2-DE3EB3967F2D}" type="datetimeFigureOut">
               <a:rPr lang="en-US" smtClean="0"/>
-              <a:t>10/12/21</a:t>
+              <a:t>10/16/2021</a:t>
             </a:fld>
             <a:endParaRPr lang="en-US"/>
           </a:p>
@@ -1405,7 +1405,7 @@
           <a:p>
             <a:fld id="{8F678F51-D1F2-DA4B-8DE2-DE3EB3967F2D}" type="datetimeFigureOut">
               <a:rPr lang="en-US" smtClean="0"/>
-              <a:t>10/12/21</a:t>
+              <a:t>10/16/2021</a:t>
             </a:fld>
             <a:endParaRPr lang="en-US"/>
           </a:p>
@@ -1817,7 +1817,7 @@
           <a:p>
             <a:fld id="{8F678F51-D1F2-DA4B-8DE2-DE3EB3967F2D}" type="datetimeFigureOut">
               <a:rPr lang="en-US" smtClean="0"/>
-              <a:t>10/12/21</a:t>
+              <a:t>10/16/2021</a:t>
             </a:fld>
             <a:endParaRPr lang="en-US"/>
           </a:p>
@@ -1958,7 +1958,7 @@
           <a:p>
             <a:fld id="{8F678F51-D1F2-DA4B-8DE2-DE3EB3967F2D}" type="datetimeFigureOut">
               <a:rPr lang="en-US" smtClean="0"/>
-              <a:t>10/12/21</a:t>
+              <a:t>10/16/2021</a:t>
             </a:fld>
             <a:endParaRPr lang="en-US"/>
           </a:p>
@@ -2071,7 +2071,7 @@
           <a:p>
             <a:fld id="{8F678F51-D1F2-DA4B-8DE2-DE3EB3967F2D}" type="datetimeFigureOut">
               <a:rPr lang="en-US" smtClean="0"/>
-              <a:t>10/12/21</a:t>
+              <a:t>10/16/2021</a:t>
             </a:fld>
             <a:endParaRPr lang="en-US"/>
           </a:p>
@@ -2382,7 +2382,7 @@
           <a:p>
             <a:fld id="{8F678F51-D1F2-DA4B-8DE2-DE3EB3967F2D}" type="datetimeFigureOut">
               <a:rPr lang="en-US" smtClean="0"/>
-              <a:t>10/12/21</a:t>
+              <a:t>10/16/2021</a:t>
             </a:fld>
             <a:endParaRPr lang="en-US"/>
           </a:p>
@@ -2670,7 +2670,7 @@
           <a:p>
             <a:fld id="{8F678F51-D1F2-DA4B-8DE2-DE3EB3967F2D}" type="datetimeFigureOut">
               <a:rPr lang="en-US" smtClean="0"/>
-              <a:t>10/12/21</a:t>
+              <a:t>10/16/2021</a:t>
             </a:fld>
             <a:endParaRPr lang="en-US"/>
           </a:p>
@@ -2941,7 +2941,7 @@
           <a:p>
             <a:fld id="{8F678F51-D1F2-DA4B-8DE2-DE3EB3967F2D}" type="datetimeFigureOut">
               <a:rPr lang="en-US" smtClean="0"/>
-              <a:t>10/12/21</a:t>
+              <a:t>10/16/2021</a:t>
             </a:fld>
             <a:endParaRPr lang="en-US"/>
           </a:p>
@@ -3438,7 +3438,7 @@
         <p:spPr>
           <a:xfrm>
             <a:off x="685798" y="1350863"/>
-            <a:ext cx="2667000" cy="1754326"/>
+            <a:ext cx="2590802" cy="1200329"/>
           </a:xfrm>
           <a:prstGeom prst="rect">
             <a:avLst/>
@@ -3451,58 +3451,73 @@
           </a:bodyPr>
           <a:lstStyle/>
           <a:p>
-            <a:r>
-              <a:rPr lang="en-US" dirty="0"/>
+            <a:pPr marL="171450" indent="-171450">
+              <a:buFont typeface="Arial" panose="020B0604020202020204" pitchFamily="34" charset="0"/>
+              <a:buChar char="•"/>
+            </a:pPr>
+            <a:r>
+              <a:rPr lang="en-US" sz="1200" dirty="0"/>
               <a:t>rank: string</a:t>
             </a:r>
           </a:p>
           <a:p>
-            <a:r>
-              <a:rPr lang="en-US" dirty="0"/>
+            <a:pPr marL="171450" indent="-171450">
+              <a:buFont typeface="Arial" panose="020B0604020202020204" pitchFamily="34" charset="0"/>
+              <a:buChar char="•"/>
+            </a:pPr>
+            <a:r>
+              <a:rPr lang="en-US" sz="1200" dirty="0"/>
               <a:t>suit: char</a:t>
             </a:r>
           </a:p>
           <a:p>
-            <a:r>
-              <a:rPr lang="en-US" dirty="0" err="1"/>
+            <a:pPr marL="171450" indent="-171450">
+              <a:buFont typeface="Arial" panose="020B0604020202020204" pitchFamily="34" charset="0"/>
+              <a:buChar char="•"/>
+            </a:pPr>
+            <a:r>
+              <a:rPr lang="en-US" sz="1200" dirty="0" err="1"/>
               <a:t>isFace</a:t>
             </a:r>
             <a:r>
-              <a:rPr lang="en-US" dirty="0"/>
-              <a:t>(): bool</a:t>
-            </a:r>
-          </a:p>
-          <a:p>
-            <a:r>
-              <a:rPr lang="en-US" dirty="0" err="1"/>
+              <a:rPr lang="en-US" sz="1200" dirty="0"/>
+              <a:t>(): bool [whether this Card is a face card]</a:t>
+            </a:r>
+          </a:p>
+          <a:p>
+            <a:pPr marL="171450" indent="-171450">
+              <a:buFont typeface="Arial" panose="020B0604020202020204" pitchFamily="34" charset="0"/>
+              <a:buChar char="•"/>
+            </a:pPr>
+            <a:r>
+              <a:rPr lang="en-US" sz="1200" dirty="0" err="1"/>
               <a:t>getRank</a:t>
             </a:r>
             <a:r>
-              <a:rPr lang="en-US" dirty="0">
+              <a:rPr lang="en-US" sz="1200" dirty="0">
                 <a:sym typeface="Wingdings" pitchFamily="2" charset="2"/>
               </a:rPr>
               <a:t>()</a:t>
             </a:r>
           </a:p>
           <a:p>
-            <a:r>
-              <a:rPr lang="en-US" dirty="0" err="1">
+            <a:pPr marL="171450" indent="-171450">
+              <a:buFont typeface="Arial" panose="020B0604020202020204" pitchFamily="34" charset="0"/>
+              <a:buChar char="•"/>
+            </a:pPr>
+            <a:r>
+              <a:rPr lang="en-US" sz="1200" dirty="0" err="1">
                 <a:sym typeface="Wingdings" pitchFamily="2" charset="2"/>
               </a:rPr>
               <a:t>getSuit</a:t>
             </a:r>
-            <a:endParaRPr lang="en-US" dirty="0">
-              <a:sym typeface="Wingdings" pitchFamily="2" charset="2"/>
-            </a:endParaRPr>
-          </a:p>
-          <a:p>
-            <a:r>
-              <a:rPr lang="en-US" dirty="0" err="1">
+            <a:r>
+              <a:rPr lang="en-US" sz="1200" dirty="0">
                 <a:sym typeface="Wingdings" pitchFamily="2" charset="2"/>
               </a:rPr>
-              <a:t>getface</a:t>
-            </a:r>
-            <a:endParaRPr lang="en-US" dirty="0"/>
+              <a:t>()</a:t>
+            </a:r>
+            <a:endParaRPr lang="en-US" sz="1200" dirty="0"/>
           </a:p>
         </p:txBody>
       </p:sp>
@@ -3529,7 +3544,7 @@
         <p:spPr>
           <a:xfrm>
             <a:off x="6328518" y="935389"/>
-            <a:ext cx="5177684" cy="2358239"/>
+            <a:ext cx="5177684" cy="2723799"/>
           </a:xfrm>
           <a:prstGeom prst="rect">
             <a:avLst/>
@@ -3586,7 +3601,7 @@
         <p:spPr>
           <a:xfrm>
             <a:off x="6422571" y="1350864"/>
-            <a:ext cx="2242458" cy="1754326"/>
+            <a:ext cx="2432260" cy="1569660"/>
           </a:xfrm>
           <a:prstGeom prst="rect">
             <a:avLst/>
@@ -3599,51 +3614,75 @@
           </a:bodyPr>
           <a:lstStyle/>
           <a:p>
-            <a:r>
-              <a:rPr lang="en-US" dirty="0"/>
+            <a:pPr marL="285750" indent="-285750">
+              <a:buFont typeface="Arial" panose="020B0604020202020204" pitchFamily="34" charset="0"/>
+              <a:buChar char="•"/>
+            </a:pPr>
+            <a:r>
+              <a:rPr lang="en-US" sz="1200" dirty="0"/>
               <a:t>cards: List</a:t>
             </a:r>
           </a:p>
           <a:p>
-            <a:r>
-              <a:rPr lang="en-US" dirty="0" err="1"/>
+            <a:pPr marL="285750" indent="-285750">
+              <a:buFont typeface="Arial" panose="020B0604020202020204" pitchFamily="34" charset="0"/>
+              <a:buChar char="•"/>
+            </a:pPr>
+            <a:r>
+              <a:rPr lang="en-US" sz="1200" dirty="0" err="1"/>
               <a:t>drawCard</a:t>
             </a:r>
             <a:r>
-              <a:rPr lang="en-US" dirty="0"/>
+              <a:rPr lang="en-US" sz="1200" dirty="0"/>
               <a:t>(): Card</a:t>
             </a:r>
           </a:p>
           <a:p>
-            <a:r>
-              <a:rPr lang="en-US" dirty="0"/>
+            <a:pPr marL="285750" indent="-285750">
+              <a:buFont typeface="Arial" panose="020B0604020202020204" pitchFamily="34" charset="0"/>
+              <a:buChar char="•"/>
+            </a:pPr>
+            <a:r>
+              <a:rPr lang="en-US" sz="1200" dirty="0"/>
               <a:t>shuffle()</a:t>
             </a:r>
           </a:p>
           <a:p>
-            <a:r>
-              <a:rPr lang="en-US" dirty="0"/>
-              <a:t>peek(): Card</a:t>
-            </a:r>
-          </a:p>
-          <a:p>
-            <a:r>
-              <a:rPr lang="en-US" dirty="0" err="1"/>
+            <a:pPr marL="285750" indent="-285750">
+              <a:buFont typeface="Arial" panose="020B0604020202020204" pitchFamily="34" charset="0"/>
+              <a:buChar char="•"/>
+            </a:pPr>
+            <a:r>
+              <a:rPr lang="en-US" sz="1200" dirty="0"/>
+              <a:t>peek(): Card [first/top card of deck]</a:t>
+            </a:r>
+          </a:p>
+          <a:p>
+            <a:pPr marL="285750" indent="-285750">
+              <a:buFont typeface="Arial" panose="020B0604020202020204" pitchFamily="34" charset="0"/>
+              <a:buChar char="•"/>
+            </a:pPr>
+            <a:r>
+              <a:rPr lang="en-US" sz="1200" dirty="0" err="1"/>
               <a:t>isEmpty</a:t>
             </a:r>
             <a:r>
-              <a:rPr lang="en-US" dirty="0"/>
+              <a:rPr lang="en-US" sz="1200" dirty="0"/>
               <a:t>(): bool</a:t>
             </a:r>
           </a:p>
           <a:p>
-            <a:r>
-              <a:rPr lang="en-US" dirty="0" err="1"/>
+            <a:pPr marL="285750" indent="-285750">
+              <a:buFont typeface="Arial" panose="020B0604020202020204" pitchFamily="34" charset="0"/>
+              <a:buChar char="•"/>
+            </a:pPr>
+            <a:r>
+              <a:rPr lang="en-US" sz="1200" dirty="0" err="1"/>
               <a:t>addCard</a:t>
             </a:r>
             <a:r>
-              <a:rPr lang="en-US" dirty="0"/>
-              <a:t>(Card)</a:t>
+              <a:rPr lang="en-US" sz="1200" dirty="0"/>
+              <a:t>(Card) [adds to bottom of deck]</a:t>
             </a:r>
           </a:p>
         </p:txBody>
@@ -3763,7 +3802,7 @@
         <p:spPr>
           <a:xfrm>
             <a:off x="685800" y="4306760"/>
-            <a:ext cx="2590800" cy="2031325"/>
+            <a:ext cx="2590800" cy="1754326"/>
           </a:xfrm>
           <a:prstGeom prst="rect">
             <a:avLst/>
@@ -3776,63 +3815,91 @@
           </a:bodyPr>
           <a:lstStyle/>
           <a:p>
-            <a:r>
-              <a:rPr lang="en-US" dirty="0"/>
+            <a:pPr marL="285750" indent="-285750">
+              <a:buFont typeface="Arial" panose="020B0604020202020204" pitchFamily="34" charset="0"/>
+              <a:buChar char="•"/>
+            </a:pPr>
+            <a:r>
+              <a:rPr lang="en-US" sz="1200" dirty="0"/>
               <a:t>cards: List</a:t>
             </a:r>
           </a:p>
           <a:p>
-            <a:r>
-              <a:rPr lang="en-US" dirty="0" err="1"/>
+            <a:pPr marL="285750" indent="-285750">
+              <a:buFont typeface="Arial" panose="020B0604020202020204" pitchFamily="34" charset="0"/>
+              <a:buChar char="•"/>
+            </a:pPr>
+            <a:r>
+              <a:rPr lang="en-US" sz="1200" dirty="0" err="1"/>
               <a:t>getCards</a:t>
             </a:r>
             <a:r>
-              <a:rPr lang="en-US" dirty="0"/>
+              <a:rPr lang="en-US" sz="1200" dirty="0"/>
               <a:t>(): Card[]</a:t>
             </a:r>
           </a:p>
           <a:p>
-            <a:r>
-              <a:rPr lang="en-US" dirty="0" err="1"/>
+            <a:pPr marL="285750" indent="-285750">
+              <a:buFont typeface="Arial" panose="020B0604020202020204" pitchFamily="34" charset="0"/>
+              <a:buChar char="•"/>
+            </a:pPr>
+            <a:r>
+              <a:rPr lang="en-US" sz="1200" dirty="0" err="1"/>
               <a:t>addCard</a:t>
             </a:r>
             <a:r>
-              <a:rPr lang="en-US" dirty="0"/>
-              <a:t>(Card)</a:t>
-            </a:r>
-          </a:p>
-          <a:p>
-            <a:r>
-              <a:rPr lang="en-US" dirty="0" err="1"/>
+              <a:rPr lang="en-US" sz="1200" dirty="0"/>
+              <a:t>(Card) [to end of hand]</a:t>
+            </a:r>
+          </a:p>
+          <a:p>
+            <a:pPr marL="285750" indent="-285750">
+              <a:buFont typeface="Arial" panose="020B0604020202020204" pitchFamily="34" charset="0"/>
+              <a:buChar char="•"/>
+            </a:pPr>
+            <a:r>
+              <a:rPr lang="en-US" sz="1200" dirty="0" err="1"/>
               <a:t>removeCard</a:t>
             </a:r>
             <a:r>
-              <a:rPr lang="en-US" dirty="0"/>
-              <a:t>(): Card</a:t>
-            </a:r>
-          </a:p>
-          <a:p>
-            <a:r>
-              <a:rPr lang="en-US" dirty="0" err="1"/>
+              <a:rPr lang="en-US" sz="1200" dirty="0"/>
+              <a:t>(): Card [remove first/top card]</a:t>
+            </a:r>
+          </a:p>
+          <a:p>
+            <a:pPr marL="285750" indent="-285750">
+              <a:buFont typeface="Arial" panose="020B0604020202020204" pitchFamily="34" charset="0"/>
+              <a:buChar char="•"/>
+            </a:pPr>
+            <a:r>
+              <a:rPr lang="en-US" sz="1200" dirty="0" err="1"/>
               <a:t>removeCard</a:t>
             </a:r>
             <a:r>
-              <a:rPr lang="en-US" dirty="0"/>
-              <a:t>(String): Card</a:t>
-            </a:r>
-          </a:p>
-          <a:p>
-            <a:r>
-              <a:rPr lang="en-US" dirty="0" err="1"/>
+              <a:rPr lang="en-US" sz="1200" dirty="0"/>
+              <a:t>(rank, suit): Card [remove specific card]</a:t>
+            </a:r>
+          </a:p>
+          <a:p>
+            <a:pPr marL="285750" indent="-285750">
+              <a:buFont typeface="Arial" panose="020B0604020202020204" pitchFamily="34" charset="0"/>
+              <a:buChar char="•"/>
+            </a:pPr>
+            <a:r>
+              <a:rPr lang="en-US" sz="1200" dirty="0" err="1"/>
               <a:t>getSize</a:t>
             </a:r>
             <a:r>
-              <a:rPr lang="en-US" dirty="0"/>
+              <a:rPr lang="en-US" sz="1200" dirty="0"/>
               <a:t>(): int</a:t>
             </a:r>
           </a:p>
           <a:p>
-            <a:endParaRPr lang="en-US" dirty="0"/>
+            <a:pPr marL="285750" indent="-285750">
+              <a:buFont typeface="Arial" panose="020B0604020202020204" pitchFamily="34" charset="0"/>
+              <a:buChar char="•"/>
+            </a:pPr>
+            <a:endParaRPr lang="en-US" sz="1200" dirty="0"/>
           </a:p>
         </p:txBody>
       </p:sp>
@@ -4016,7 +4083,7 @@
         <p:spPr>
           <a:xfrm>
             <a:off x="494300" y="1497868"/>
-            <a:ext cx="2547257" cy="1477328"/>
+            <a:ext cx="2547257" cy="1015663"/>
           </a:xfrm>
           <a:prstGeom prst="rect">
             <a:avLst/>
@@ -4029,44 +4096,64 @@
           </a:bodyPr>
           <a:lstStyle/>
           <a:p>
-            <a:r>
-              <a:rPr lang="en-US" dirty="0"/>
+            <a:pPr marL="171450" indent="-171450">
+              <a:buFont typeface="Arial" panose="020B0604020202020204" pitchFamily="34" charset="0"/>
+              <a:buChar char="•"/>
+            </a:pPr>
+            <a:r>
+              <a:rPr lang="en-US" sz="1200" dirty="0"/>
               <a:t>hand: Hand</a:t>
             </a:r>
           </a:p>
           <a:p>
-            <a:r>
-              <a:rPr lang="en-US" dirty="0"/>
+            <a:pPr marL="171450" indent="-171450">
+              <a:buFont typeface="Arial" panose="020B0604020202020204" pitchFamily="34" charset="0"/>
+              <a:buChar char="•"/>
+            </a:pPr>
+            <a:r>
+              <a:rPr lang="en-US" sz="1200" dirty="0"/>
               <a:t>name: String</a:t>
             </a:r>
           </a:p>
           <a:p>
-            <a:r>
-              <a:rPr lang="en-US" dirty="0" err="1"/>
+            <a:pPr marL="171450" indent="-171450">
+              <a:buFont typeface="Arial" panose="020B0604020202020204" pitchFamily="34" charset="0"/>
+              <a:buChar char="•"/>
+            </a:pPr>
+            <a:r>
+              <a:rPr lang="en-US" sz="1200" dirty="0" err="1"/>
               <a:t>addToHand</a:t>
             </a:r>
             <a:r>
-              <a:rPr lang="en-US" dirty="0"/>
+              <a:rPr lang="en-US" sz="1200" dirty="0"/>
               <a:t>(Card)</a:t>
             </a:r>
           </a:p>
           <a:p>
-            <a:r>
-              <a:rPr lang="en-US" dirty="0" err="1"/>
+            <a:pPr marL="171450" indent="-171450">
+              <a:buFont typeface="Arial" panose="020B0604020202020204" pitchFamily="34" charset="0"/>
+              <a:buChar char="•"/>
+            </a:pPr>
+            <a:r>
+              <a:rPr lang="en-US" sz="1200" dirty="0" err="1"/>
               <a:t>removeFromHand</a:t>
             </a:r>
             <a:r>
-              <a:rPr lang="en-US" dirty="0"/>
+              <a:rPr lang="en-US" sz="1200" dirty="0"/>
               <a:t>(Card)</a:t>
             </a:r>
           </a:p>
           <a:p>
-            <a:r>
-              <a:rPr lang="en-US" dirty="0" err="1"/>
+            <a:pPr marL="171450" indent="-171450">
+              <a:buFont typeface="Arial" panose="020B0604020202020204" pitchFamily="34" charset="0"/>
+              <a:buChar char="•"/>
+            </a:pPr>
+            <a:r>
+              <a:rPr lang="en-US" sz="1200" dirty="0" err="1"/>
               <a:t>getHand</a:t>
             </a:r>
             <a:r>
-              <a:rPr lang="en-US" dirty="0"/>
+              <a:rPr lang="en-US" sz="1200" dirty="0"/>
               <a:t>(): Hand</a:t>
             </a:r>
           </a:p>
@@ -4193,7 +4280,7 @@
         <p:spPr>
           <a:xfrm>
             <a:off x="6004735" y="1350570"/>
-            <a:ext cx="2754086" cy="1754326"/>
+            <a:ext cx="2754086" cy="1384995"/>
           </a:xfrm>
           <a:prstGeom prst="rect">
             <a:avLst/>
@@ -4206,54 +4293,92 @@
           </a:bodyPr>
           <a:lstStyle/>
           <a:p>
-            <a:r>
-              <a:rPr lang="en-US" dirty="0"/>
+            <a:pPr marL="171450" indent="-171450">
+              <a:buFont typeface="Arial" panose="020B0604020202020204" pitchFamily="34" charset="0"/>
+              <a:buChar char="•"/>
+            </a:pPr>
+            <a:r>
+              <a:rPr lang="en-US" sz="1200" dirty="0"/>
               <a:t>players: Player[]</a:t>
             </a:r>
           </a:p>
           <a:p>
-            <a:r>
-              <a:rPr lang="en-US" dirty="0"/>
+            <a:pPr marL="171450" indent="-171450">
+              <a:buFont typeface="Arial" panose="020B0604020202020204" pitchFamily="34" charset="0"/>
+              <a:buChar char="•"/>
+            </a:pPr>
+            <a:r>
+              <a:rPr lang="en-US" sz="1200" dirty="0"/>
               <a:t>deck: Deck</a:t>
             </a:r>
           </a:p>
           <a:p>
-            <a:r>
-              <a:rPr lang="en-US" dirty="0" err="1"/>
+            <a:pPr marL="171450" indent="-171450">
+              <a:buFont typeface="Arial" panose="020B0604020202020204" pitchFamily="34" charset="0"/>
+              <a:buChar char="•"/>
+            </a:pPr>
+            <a:r>
+              <a:rPr lang="en-US" sz="1200" dirty="0" err="1"/>
               <a:t>currPlayer</a:t>
             </a:r>
             <a:r>
-              <a:rPr lang="en-US" dirty="0"/>
+              <a:rPr lang="en-US" sz="1200" dirty="0"/>
               <a:t>: Player</a:t>
             </a:r>
           </a:p>
           <a:p>
-            <a:r>
-              <a:rPr lang="en-US" dirty="0" err="1"/>
+            <a:pPr marL="171450" indent="-171450">
+              <a:buFont typeface="Arial" panose="020B0604020202020204" pitchFamily="34" charset="0"/>
+              <a:buChar char="•"/>
+            </a:pPr>
+            <a:r>
+              <a:rPr lang="en-US" sz="1200" dirty="0" err="1"/>
+              <a:t>currPlayerIndex</a:t>
+            </a:r>
+            <a:r>
+              <a:rPr lang="en-US" sz="1200" dirty="0"/>
+              <a:t>: int</a:t>
+            </a:r>
+          </a:p>
+          <a:p>
+            <a:pPr marL="171450" indent="-171450">
+              <a:buFont typeface="Arial" panose="020B0604020202020204" pitchFamily="34" charset="0"/>
+              <a:buChar char="•"/>
+            </a:pPr>
+            <a:r>
+              <a:rPr lang="en-US" sz="1200" dirty="0" err="1"/>
               <a:t>calculateValidMoves</a:t>
             </a:r>
             <a:r>
-              <a:rPr lang="en-US" dirty="0"/>
+              <a:rPr lang="en-US" sz="1200" dirty="0"/>
               <a:t>()</a:t>
             </a:r>
           </a:p>
           <a:p>
-            <a:r>
-              <a:rPr lang="en-US" dirty="0" err="1"/>
+            <a:pPr marL="171450" indent="-171450">
+              <a:buFont typeface="Arial" panose="020B0604020202020204" pitchFamily="34" charset="0"/>
+              <a:buChar char="•"/>
+            </a:pPr>
+            <a:r>
+              <a:rPr lang="en-US" sz="1200" dirty="0" err="1"/>
               <a:t>makeMove</a:t>
             </a:r>
             <a:r>
-              <a:rPr lang="en-US" dirty="0"/>
+              <a:rPr lang="en-US" sz="1200" dirty="0"/>
               <a:t>(int)</a:t>
             </a:r>
           </a:p>
           <a:p>
-            <a:r>
-              <a:rPr lang="en-US" dirty="0" err="1"/>
+            <a:pPr marL="171450" indent="-171450">
+              <a:buFont typeface="Arial" panose="020B0604020202020204" pitchFamily="34" charset="0"/>
+              <a:buChar char="•"/>
+            </a:pPr>
+            <a:r>
+              <a:rPr lang="en-US" sz="1200" dirty="0" err="1"/>
               <a:t>checkWin</a:t>
             </a:r>
             <a:r>
-              <a:rPr lang="en-US" dirty="0"/>
+              <a:rPr lang="en-US" sz="1200" dirty="0"/>
               <a:t>(): bool</a:t>
             </a:r>
           </a:p>
@@ -4390,7 +4515,7 @@
         <p:spPr>
           <a:xfrm>
             <a:off x="6004735" y="3966903"/>
-            <a:ext cx="2754086" cy="369332"/>
+            <a:ext cx="2754086" cy="461665"/>
           </a:xfrm>
           <a:prstGeom prst="rect">
             <a:avLst/>
@@ -4403,14 +4528,33 @@
           </a:bodyPr>
           <a:lstStyle/>
           <a:p>
-            <a:r>
-              <a:rPr lang="en-US" dirty="0" err="1"/>
+            <a:pPr marL="171450" indent="-171450">
+              <a:buFont typeface="Arial" panose="020B0604020202020204" pitchFamily="34" charset="0"/>
+              <a:buChar char="•"/>
+            </a:pPr>
+            <a:r>
+              <a:rPr lang="en-US" sz="1200" dirty="0" err="1"/>
               <a:t>playingField</a:t>
             </a:r>
             <a:r>
-              <a:rPr lang="en-US" dirty="0"/>
+              <a:rPr lang="en-US" sz="1200" dirty="0"/>
               <a:t>: Stack</a:t>
             </a:r>
+          </a:p>
+          <a:p>
+            <a:pPr marL="171450" indent="-171450">
+              <a:buFont typeface="Arial" panose="020B0604020202020204" pitchFamily="34" charset="0"/>
+              <a:buChar char="•"/>
+            </a:pPr>
+            <a:r>
+              <a:rPr lang="en-US" sz="1200" dirty="0"/>
+              <a:t>controller: </a:t>
+            </a:r>
+            <a:r>
+              <a:rPr lang="en-US" sz="1200" dirty="0" err="1"/>
+              <a:t>InOut</a:t>
+            </a:r>
+            <a:endParaRPr lang="en-US" sz="1200" dirty="0"/>
           </a:p>
         </p:txBody>
       </p:sp>
@@ -4446,6 +4590,54 @@
               <a:rPr lang="en-US" sz="2400" dirty="0"/>
               <a:t>USE CASES</a:t>
             </a:r>
+          </a:p>
+        </p:txBody>
+      </p:sp>
+      <p:sp>
+        <p:nvSpPr>
+          <p:cNvPr id="15" name="TextBox 14">
+            <a:extLst>
+              <a:ext uri="{FF2B5EF4-FFF2-40B4-BE49-F238E27FC236}">
+                <a16:creationId xmlns:a16="http://schemas.microsoft.com/office/drawing/2014/main" id="{A82C6E3A-9AD7-4D49-8EC7-45E17D253B3D}"/>
+              </a:ext>
+            </a:extLst>
+          </p:cNvPr>
+          <p:cNvSpPr txBox="1"/>
+          <p:nvPr/>
+        </p:nvSpPr>
+        <p:spPr>
+          <a:xfrm>
+            <a:off x="8486678" y="3998065"/>
+            <a:ext cx="2286000" cy="923330"/>
+          </a:xfrm>
+          <a:prstGeom prst="rect">
+            <a:avLst/>
+          </a:prstGeom>
+          <a:noFill/>
+        </p:spPr>
+        <p:txBody>
+          <a:bodyPr wrap="square" rtlCol="0">
+            <a:spAutoFit/>
+          </a:bodyPr>
+          <a:lstStyle/>
+          <a:p>
+            <a:r>
+              <a:rPr lang="en-US" dirty="0"/>
+              <a:t>Card</a:t>
+            </a:r>
+          </a:p>
+          <a:p>
+            <a:r>
+              <a:rPr lang="en-US" dirty="0"/>
+              <a:t>Hand</a:t>
+            </a:r>
+          </a:p>
+          <a:p>
+            <a:r>
+              <a:rPr lang="en-US" dirty="0" err="1"/>
+              <a:t>InOut</a:t>
+            </a:r>
+            <a:endParaRPr lang="en-US" dirty="0"/>
           </a:p>
         </p:txBody>
       </p:sp>
@@ -4538,8 +4730,12 @@
           <a:lstStyle/>
           <a:p>
             <a:r>
+              <a:rPr lang="en-US" dirty="0" err="1"/>
+              <a:t>InOut</a:t>
+            </a:r>
+            <a:r>
               <a:rPr lang="en-US" dirty="0"/>
-              <a:t>Card Picker</a:t>
+              <a:t> (interface)</a:t>
             </a:r>
           </a:p>
         </p:txBody>
@@ -4559,7 +4755,7 @@
         <p:spPr>
           <a:xfrm>
             <a:off x="555128" y="1188762"/>
-            <a:ext cx="2177142" cy="369332"/>
+            <a:ext cx="2177142" cy="1384995"/>
           </a:xfrm>
           <a:prstGeom prst="rect">
             <a:avLst/>
@@ -4572,23 +4768,90 @@
           </a:bodyPr>
           <a:lstStyle/>
           <a:p>
-            <a:r>
-              <a:rPr lang="en-US" dirty="0" err="1"/>
-              <a:t>takeInput</a:t>
-            </a:r>
-            <a:r>
-              <a:rPr lang="en-US" dirty="0"/>
-              <a:t>()</a:t>
+            <a:pPr marL="171450" indent="-171450">
+              <a:buFont typeface="Arial" panose="020B0604020202020204" pitchFamily="34" charset="0"/>
+              <a:buChar char="•"/>
+            </a:pPr>
+            <a:r>
+              <a:rPr lang="en-US" sz="1200" dirty="0" err="1"/>
+              <a:t>getCard</a:t>
+            </a:r>
+            <a:r>
+              <a:rPr lang="en-US" sz="1200" dirty="0"/>
+              <a:t>() [return user selected card]</a:t>
+            </a:r>
+          </a:p>
+          <a:p>
+            <a:pPr marL="171450" indent="-171450">
+              <a:buFont typeface="Arial" panose="020B0604020202020204" pitchFamily="34" charset="0"/>
+              <a:buChar char="•"/>
+            </a:pPr>
+            <a:r>
+              <a:rPr lang="en-US" sz="1200" dirty="0" err="1"/>
+              <a:t>drawCard</a:t>
+            </a:r>
+            <a:r>
+              <a:rPr lang="en-US" sz="1200" dirty="0"/>
+              <a:t>() [return whether user wishes to draw a card from the deck]</a:t>
+            </a:r>
+          </a:p>
+          <a:p>
+            <a:pPr marL="171450" indent="-171450">
+              <a:buFont typeface="Arial" panose="020B0604020202020204" pitchFamily="34" charset="0"/>
+              <a:buChar char="•"/>
+            </a:pPr>
+            <a:r>
+              <a:rPr lang="en-US" sz="1200" dirty="0" err="1"/>
+              <a:t>sendOutput</a:t>
+            </a:r>
+            <a:r>
+              <a:rPr lang="en-US" sz="1200" dirty="0"/>
+              <a:t>() [send output to the user]</a:t>
+            </a:r>
+          </a:p>
+        </p:txBody>
+      </p:sp>
+      <p:sp>
+        <p:nvSpPr>
+          <p:cNvPr id="12" name="TextBox 11">
+            <a:extLst>
+              <a:ext uri="{FF2B5EF4-FFF2-40B4-BE49-F238E27FC236}">
+                <a16:creationId xmlns:a16="http://schemas.microsoft.com/office/drawing/2014/main" id="{AA0A3D3F-55E4-F742-AFA3-023448D57FFD}"/>
+              </a:ext>
+            </a:extLst>
+          </p:cNvPr>
+          <p:cNvSpPr txBox="1"/>
+          <p:nvPr/>
+        </p:nvSpPr>
+        <p:spPr>
+          <a:xfrm>
+            <a:off x="4620985" y="147153"/>
+            <a:ext cx="2819400" cy="461665"/>
+          </a:xfrm>
+          <a:prstGeom prst="rect">
+            <a:avLst/>
+          </a:prstGeom>
+          <a:noFill/>
+        </p:spPr>
+        <p:txBody>
+          <a:bodyPr wrap="square" rtlCol="0">
+            <a:spAutoFit/>
+          </a:bodyPr>
+          <a:lstStyle/>
+          <a:p>
+            <a:r>
+              <a:rPr lang="en-US" sz="2400" dirty="0"/>
+              <a:t>CONTROLLERS/UI</a:t>
             </a:r>
           </a:p>
         </p:txBody>
       </p:sp>
       <p:pic>
         <p:nvPicPr>
-          <p:cNvPr id="8" name="Picture 7" descr="Shape&#10;&#10;Description automatically generated with medium confidence">
-            <a:extLst>
-              <a:ext uri="{FF2B5EF4-FFF2-40B4-BE49-F238E27FC236}">
-                <a16:creationId xmlns:a16="http://schemas.microsoft.com/office/drawing/2014/main" id="{719B30A2-7E9F-3F4A-9BE2-41FABF418283}"/>
+          <p:cNvPr id="9" name="Picture 8" descr="Shape&#10;&#10;Description automatically generated with medium confidence">
+            <a:extLst>
+              <a:ext uri="{FF2B5EF4-FFF2-40B4-BE49-F238E27FC236}">
+                <a16:creationId xmlns:a16="http://schemas.microsoft.com/office/drawing/2014/main" id="{0A835CBF-FF0D-4485-92D4-670079ABD9FF}"/>
               </a:ext>
             </a:extLst>
           </p:cNvPr>
@@ -4605,7 +4868,7 @@
         </p:blipFill>
         <p:spPr>
           <a:xfrm>
-            <a:off x="6096000" y="652752"/>
+            <a:off x="6459715" y="652752"/>
             <a:ext cx="5177157" cy="2358238"/>
           </a:xfrm>
           <a:prstGeom prst="rect">
@@ -4615,10 +4878,10 @@
       </p:pic>
       <p:sp>
         <p:nvSpPr>
-          <p:cNvPr id="10" name="TextBox 9">
-            <a:extLst>
-              <a:ext uri="{FF2B5EF4-FFF2-40B4-BE49-F238E27FC236}">
-                <a16:creationId xmlns:a16="http://schemas.microsoft.com/office/drawing/2014/main" id="{688F0312-24F4-FF46-9914-728594811F0F}"/>
+          <p:cNvPr id="13" name="TextBox 12">
+            <a:extLst>
+              <a:ext uri="{FF2B5EF4-FFF2-40B4-BE49-F238E27FC236}">
+                <a16:creationId xmlns:a16="http://schemas.microsoft.com/office/drawing/2014/main" id="{0ACEE60A-F809-4BC3-B4AA-626DAB2C46CB}"/>
               </a:ext>
             </a:extLst>
           </p:cNvPr>
@@ -4627,8 +4890,8 @@
         </p:nvSpPr>
         <p:spPr>
           <a:xfrm>
-            <a:off x="6237514" y="731562"/>
-            <a:ext cx="2405743" cy="369332"/>
+            <a:off x="6572750" y="731562"/>
+            <a:ext cx="4954942" cy="369332"/>
           </a:xfrm>
           <a:prstGeom prst="rect">
             <a:avLst/>
@@ -4642,18 +4905,27 @@
           <a:lstStyle/>
           <a:p>
             <a:r>
+              <a:rPr lang="en-US" dirty="0" err="1"/>
+              <a:t>ConsoleInOut</a:t>
+            </a:r>
+            <a:r>
               <a:rPr lang="en-US" dirty="0"/>
-              <a:t>Card Printer</a:t>
-            </a:r>
-          </a:p>
-        </p:txBody>
-      </p:sp>
-      <p:sp>
-        <p:nvSpPr>
-          <p:cNvPr id="11" name="TextBox 10">
-            <a:extLst>
-              <a:ext uri="{FF2B5EF4-FFF2-40B4-BE49-F238E27FC236}">
-                <a16:creationId xmlns:a16="http://schemas.microsoft.com/office/drawing/2014/main" id="{70B2B115-D605-AF4E-AA4C-5B30E2A91748}"/>
+              <a:t> implements </a:t>
+            </a:r>
+            <a:r>
+              <a:rPr lang="en-US" dirty="0" err="1"/>
+              <a:t>InOut</a:t>
+            </a:r>
+            <a:endParaRPr lang="en-US" dirty="0"/>
+          </a:p>
+        </p:txBody>
+      </p:sp>
+      <p:sp>
+        <p:nvSpPr>
+          <p:cNvPr id="14" name="TextBox 13">
+            <a:extLst>
+              <a:ext uri="{FF2B5EF4-FFF2-40B4-BE49-F238E27FC236}">
+                <a16:creationId xmlns:a16="http://schemas.microsoft.com/office/drawing/2014/main" id="{79E1B1F0-6A14-43A3-AEA7-38F1000D9CEB}"/>
               </a:ext>
             </a:extLst>
           </p:cNvPr>
@@ -4662,8 +4934,8 @@
         </p:nvSpPr>
         <p:spPr>
           <a:xfrm>
-            <a:off x="6237514" y="1188762"/>
-            <a:ext cx="1970315" cy="646331"/>
+            <a:off x="6572750" y="1188762"/>
+            <a:ext cx="2177142" cy="646331"/>
           </a:xfrm>
           <a:prstGeom prst="rect">
             <a:avLst/>
@@ -4676,59 +4948,29 @@
           </a:bodyPr>
           <a:lstStyle/>
           <a:p>
-            <a:r>
-              <a:rPr lang="en-US" dirty="0" err="1"/>
-              <a:t>printCard</a:t>
-            </a:r>
-            <a:r>
-              <a:rPr lang="en-US" dirty="0"/>
-              <a:t>()</a:t>
-            </a:r>
-          </a:p>
-          <a:p>
-            <a:r>
-              <a:rPr lang="en-US" dirty="0" err="1"/>
-              <a:t>printHand</a:t>
-            </a:r>
-            <a:r>
-              <a:rPr lang="en-US" dirty="0"/>
-              <a:t>()</a:t>
-            </a:r>
-          </a:p>
-        </p:txBody>
-      </p:sp>
-      <p:sp>
-        <p:nvSpPr>
-          <p:cNvPr id="12" name="TextBox 11">
-            <a:extLst>
-              <a:ext uri="{FF2B5EF4-FFF2-40B4-BE49-F238E27FC236}">
-                <a16:creationId xmlns:a16="http://schemas.microsoft.com/office/drawing/2014/main" id="{AA0A3D3F-55E4-F742-AFA3-023448D57FFD}"/>
-              </a:ext>
-            </a:extLst>
-          </p:cNvPr>
-          <p:cNvSpPr txBox="1"/>
-          <p:nvPr/>
-        </p:nvSpPr>
-        <p:spPr>
-          <a:xfrm>
-            <a:off x="4620985" y="147153"/>
-            <a:ext cx="2819400" cy="461665"/>
-          </a:xfrm>
-          <a:prstGeom prst="rect">
-            <a:avLst/>
-          </a:prstGeom>
-          <a:noFill/>
-        </p:spPr>
-        <p:txBody>
-          <a:bodyPr wrap="square" rtlCol="0">
-            <a:spAutoFit/>
-          </a:bodyPr>
-          <a:lstStyle/>
-          <a:p>
-            <a:r>
-              <a:rPr lang="en-US" sz="2400" dirty="0"/>
-              <a:t>GUI, CONTROLLER</a:t>
-            </a:r>
+            <a:pPr marL="171450" indent="-171450">
+              <a:buFont typeface="Arial" panose="020B0604020202020204" pitchFamily="34" charset="0"/>
+              <a:buChar char="•"/>
+            </a:pPr>
+            <a:r>
+              <a:rPr lang="en-US" sz="1200" dirty="0"/>
+              <a:t>Command line interface</a:t>
+            </a:r>
+          </a:p>
+          <a:p>
+            <a:pPr marL="171450" indent="-171450">
+              <a:buFont typeface="Arial" panose="020B0604020202020204" pitchFamily="34" charset="0"/>
+              <a:buChar char="•"/>
+            </a:pPr>
+            <a:r>
+              <a:rPr lang="en-US" sz="1200" dirty="0"/>
+              <a:t>Uses inputs from console to implement </a:t>
+            </a:r>
+            <a:r>
+              <a:rPr lang="en-US" sz="1200" dirty="0" err="1"/>
+              <a:t>InOut</a:t>
+            </a:r>
+            <a:endParaRPr lang="en-US" sz="1200" dirty="0"/>
           </a:p>
         </p:txBody>
       </p:sp>

</xml_diff>

<commit_message>
Export CRC cards to PDF
</commit_message>
<xml_diff>
--- a/phase0/crccards.pptx
+++ b/phase0/crccards.pptx
@@ -261,7 +261,7 @@
           <a:p>
             <a:fld id="{8F678F51-D1F2-DA4B-8DE2-DE3EB3967F2D}" type="datetimeFigureOut">
               <a:rPr lang="en-US" smtClean="0"/>
-              <a:t>10/16/2021</a:t>
+              <a:t>10/17/2021</a:t>
             </a:fld>
             <a:endParaRPr lang="en-US"/>
           </a:p>
@@ -459,7 +459,7 @@
           <a:p>
             <a:fld id="{8F678F51-D1F2-DA4B-8DE2-DE3EB3967F2D}" type="datetimeFigureOut">
               <a:rPr lang="en-US" smtClean="0"/>
-              <a:t>10/16/2021</a:t>
+              <a:t>10/17/2021</a:t>
             </a:fld>
             <a:endParaRPr lang="en-US"/>
           </a:p>
@@ -667,7 +667,7 @@
           <a:p>
             <a:fld id="{8F678F51-D1F2-DA4B-8DE2-DE3EB3967F2D}" type="datetimeFigureOut">
               <a:rPr lang="en-US" smtClean="0"/>
-              <a:t>10/16/2021</a:t>
+              <a:t>10/17/2021</a:t>
             </a:fld>
             <a:endParaRPr lang="en-US"/>
           </a:p>
@@ -865,7 +865,7 @@
           <a:p>
             <a:fld id="{8F678F51-D1F2-DA4B-8DE2-DE3EB3967F2D}" type="datetimeFigureOut">
               <a:rPr lang="en-US" smtClean="0"/>
-              <a:t>10/16/2021</a:t>
+              <a:t>10/17/2021</a:t>
             </a:fld>
             <a:endParaRPr lang="en-US"/>
           </a:p>
@@ -1140,7 +1140,7 @@
           <a:p>
             <a:fld id="{8F678F51-D1F2-DA4B-8DE2-DE3EB3967F2D}" type="datetimeFigureOut">
               <a:rPr lang="en-US" smtClean="0"/>
-              <a:t>10/16/2021</a:t>
+              <a:t>10/17/2021</a:t>
             </a:fld>
             <a:endParaRPr lang="en-US"/>
           </a:p>
@@ -1405,7 +1405,7 @@
           <a:p>
             <a:fld id="{8F678F51-D1F2-DA4B-8DE2-DE3EB3967F2D}" type="datetimeFigureOut">
               <a:rPr lang="en-US" smtClean="0"/>
-              <a:t>10/16/2021</a:t>
+              <a:t>10/17/2021</a:t>
             </a:fld>
             <a:endParaRPr lang="en-US"/>
           </a:p>
@@ -1817,7 +1817,7 @@
           <a:p>
             <a:fld id="{8F678F51-D1F2-DA4B-8DE2-DE3EB3967F2D}" type="datetimeFigureOut">
               <a:rPr lang="en-US" smtClean="0"/>
-              <a:t>10/16/2021</a:t>
+              <a:t>10/17/2021</a:t>
             </a:fld>
             <a:endParaRPr lang="en-US"/>
           </a:p>
@@ -1958,7 +1958,7 @@
           <a:p>
             <a:fld id="{8F678F51-D1F2-DA4B-8DE2-DE3EB3967F2D}" type="datetimeFigureOut">
               <a:rPr lang="en-US" smtClean="0"/>
-              <a:t>10/16/2021</a:t>
+              <a:t>10/17/2021</a:t>
             </a:fld>
             <a:endParaRPr lang="en-US"/>
           </a:p>
@@ -2071,7 +2071,7 @@
           <a:p>
             <a:fld id="{8F678F51-D1F2-DA4B-8DE2-DE3EB3967F2D}" type="datetimeFigureOut">
               <a:rPr lang="en-US" smtClean="0"/>
-              <a:t>10/16/2021</a:t>
+              <a:t>10/17/2021</a:t>
             </a:fld>
             <a:endParaRPr lang="en-US"/>
           </a:p>
@@ -2382,7 +2382,7 @@
           <a:p>
             <a:fld id="{8F678F51-D1F2-DA4B-8DE2-DE3EB3967F2D}" type="datetimeFigureOut">
               <a:rPr lang="en-US" smtClean="0"/>
-              <a:t>10/16/2021</a:t>
+              <a:t>10/17/2021</a:t>
             </a:fld>
             <a:endParaRPr lang="en-US"/>
           </a:p>
@@ -2670,7 +2670,7 @@
           <a:p>
             <a:fld id="{8F678F51-D1F2-DA4B-8DE2-DE3EB3967F2D}" type="datetimeFigureOut">
               <a:rPr lang="en-US" smtClean="0"/>
-              <a:t>10/16/2021</a:t>
+              <a:t>10/17/2021</a:t>
             </a:fld>
             <a:endParaRPr lang="en-US"/>
           </a:p>
@@ -2941,7 +2941,7 @@
           <a:p>
             <a:fld id="{8F678F51-D1F2-DA4B-8DE2-DE3EB3967F2D}" type="datetimeFigureOut">
               <a:rPr lang="en-US" smtClean="0"/>
-              <a:t>10/16/2021</a:t>
+              <a:t>10/17/2021</a:t>
             </a:fld>
             <a:endParaRPr lang="en-US"/>
           </a:p>
@@ -4280,7 +4280,7 @@
         <p:spPr>
           <a:xfrm>
             <a:off x="6004735" y="1350570"/>
-            <a:ext cx="2754086" cy="1384995"/>
+            <a:ext cx="2754086" cy="1569660"/>
           </a:xfrm>
           <a:prstGeom prst="rect">
             <a:avLst/>
@@ -4365,7 +4365,7 @@
             </a:r>
             <a:r>
               <a:rPr lang="en-US" sz="1200" dirty="0"/>
-              <a:t>(int)</a:t>
+              <a:t>(Card)</a:t>
             </a:r>
           </a:p>
           <a:p>
@@ -4380,6 +4380,20 @@
             <a:r>
               <a:rPr lang="en-US" sz="1200" dirty="0"/>
               <a:t>(): bool</a:t>
+            </a:r>
+          </a:p>
+          <a:p>
+            <a:pPr marL="171450" indent="-171450">
+              <a:buFont typeface="Arial" panose="020B0604020202020204" pitchFamily="34" charset="0"/>
+              <a:buChar char="•"/>
+            </a:pPr>
+            <a:r>
+              <a:rPr lang="en-US" sz="1200" dirty="0" err="1"/>
+              <a:t>startGame</a:t>
+            </a:r>
+            <a:r>
+              <a:rPr lang="en-US" sz="1200" dirty="0"/>
+              <a:t>() [main game loop]</a:t>
             </a:r>
           </a:p>
         </p:txBody>
@@ -4515,7 +4529,7 @@
         <p:spPr>
           <a:xfrm>
             <a:off x="6004735" y="3966903"/>
-            <a:ext cx="2754086" cy="461665"/>
+            <a:ext cx="2754086" cy="830997"/>
           </a:xfrm>
           <a:prstGeom prst="rect">
             <a:avLst/>
@@ -4554,6 +4568,27 @@
               <a:rPr lang="en-US" sz="1200" dirty="0" err="1"/>
               <a:t>InOut</a:t>
             </a:r>
+            <a:endParaRPr lang="en-US" sz="1200" dirty="0"/>
+          </a:p>
+          <a:p>
+            <a:pPr marL="171450" indent="-171450">
+              <a:buFont typeface="Arial" panose="020B0604020202020204" pitchFamily="34" charset="0"/>
+              <a:buChar char="•"/>
+            </a:pPr>
+            <a:r>
+              <a:rPr lang="en-US" sz="1200" dirty="0" err="1"/>
+              <a:t>hasValidMove</a:t>
+            </a:r>
+            <a:r>
+              <a:rPr lang="en-US" sz="1200" dirty="0"/>
+              <a:t>()</a:t>
+            </a:r>
+          </a:p>
+          <a:p>
+            <a:pPr marL="171450" indent="-171450">
+              <a:buFont typeface="Arial" panose="020B0604020202020204" pitchFamily="34" charset="0"/>
+              <a:buChar char="•"/>
+            </a:pPr>
             <a:endParaRPr lang="en-US" sz="1200" dirty="0"/>
           </a:p>
         </p:txBody>

</xml_diff>